<commit_message>
Remaining Tag helpers with Example
</commit_message>
<xml_diff>
--- a/TagHelperTry/NewFolder/Tag Helpers in CORE.pptx
+++ b/TagHelperTry/NewFolder/Tag Helpers in CORE.pptx
@@ -5,7 +5,7 @@
     <p:sldMasterId id="2147483648" r:id="rId1"/>
   </p:sldMasterIdLst>
   <p:notesMasterIdLst>
-    <p:notesMasterId r:id="rId11"/>
+    <p:notesMasterId r:id="rId12"/>
   </p:notesMasterIdLst>
   <p:sldIdLst>
     <p:sldId id="256" r:id="rId2"/>
@@ -17,6 +17,7 @@
     <p:sldId id="265" r:id="rId8"/>
     <p:sldId id="262" r:id="rId9"/>
     <p:sldId id="264" r:id="rId10"/>
+    <p:sldId id="266" r:id="rId11"/>
   </p:sldIdLst>
   <p:sldSz cx="12192000" cy="6858000"/>
   <p:notesSz cx="6858000" cy="9144000"/>
@@ -3473,6 +3474,577 @@
 </p:sld>
 </file>
 
+<file path=ppt/slides/slide10.xml><?xml version="1.0" encoding="utf-8"?>
+<p:sld xmlns:a="http://schemas.openxmlformats.org/drawingml/2006/main" xmlns:r="http://schemas.openxmlformats.org/officeDocument/2006/relationships" xmlns:p="http://schemas.openxmlformats.org/presentationml/2006/main">
+  <p:cSld>
+    <p:spTree>
+      <p:nvGrpSpPr>
+        <p:cNvPr id="1" name=""/>
+        <p:cNvGrpSpPr/>
+        <p:nvPr/>
+      </p:nvGrpSpPr>
+      <p:grpSpPr>
+        <a:xfrm>
+          <a:off x="0" y="0"/>
+          <a:ext cx="0" cy="0"/>
+          <a:chOff x="0" y="0"/>
+          <a:chExt cx="0" cy="0"/>
+        </a:xfrm>
+      </p:grpSpPr>
+      <p:sp>
+        <p:nvSpPr>
+          <p:cNvPr id="2" name="Title 1"/>
+          <p:cNvSpPr>
+            <a:spLocks noGrp="1"/>
+          </p:cNvSpPr>
+          <p:nvPr>
+            <p:ph type="title"/>
+          </p:nvPr>
+        </p:nvSpPr>
+        <p:spPr/>
+        <p:txBody>
+          <a:bodyPr/>
+          <a:lstStyle/>
+          <a:p>
+            <a:r>
+              <a:rPr lang="en-US" dirty="0" smtClean="0"/>
+              <a:t>Radio button Tag helper</a:t>
+            </a:r>
+            <a:endParaRPr lang="en-US" dirty="0"/>
+          </a:p>
+        </p:txBody>
+      </p:sp>
+      <p:sp>
+        <p:nvSpPr>
+          <p:cNvPr id="3" name="Content Placeholder 2"/>
+          <p:cNvSpPr>
+            <a:spLocks noGrp="1"/>
+          </p:cNvSpPr>
+          <p:nvPr>
+            <p:ph idx="1"/>
+          </p:nvPr>
+        </p:nvSpPr>
+        <p:spPr/>
+        <p:txBody>
+          <a:bodyPr/>
+          <a:lstStyle/>
+          <a:p>
+            <a:r>
+              <a:rPr lang="en-US" dirty="0" smtClean="0"/>
+              <a:t>Set </a:t>
+            </a:r>
+            <a:r>
+              <a:rPr lang="en-US" dirty="0" smtClean="0">
+                <a:solidFill>
+                  <a:srgbClr val="FF0000"/>
+                </a:solidFill>
+              </a:rPr>
+              <a:t>asp-for</a:t>
+            </a:r>
+            <a:r>
+              <a:rPr lang="en-US" dirty="0" smtClean="0"/>
+              <a:t> and value property of radio button</a:t>
+            </a:r>
+          </a:p>
+          <a:p>
+            <a:r>
+              <a:rPr lang="en-US" dirty="0" smtClean="0"/>
+              <a:t>NOTE: set same property name in </a:t>
+            </a:r>
+            <a:r>
+              <a:rPr lang="en-US" dirty="0" smtClean="0">
+                <a:solidFill>
+                  <a:srgbClr val="FF0000"/>
+                </a:solidFill>
+              </a:rPr>
+              <a:t>asp-for</a:t>
+            </a:r>
+            <a:r>
+              <a:rPr lang="en-US" dirty="0" smtClean="0"/>
+              <a:t> to group radio button</a:t>
+            </a:r>
+            <a:endParaRPr lang="en-US" dirty="0"/>
+          </a:p>
+        </p:txBody>
+      </p:sp>
+      <p:sp>
+        <p:nvSpPr>
+          <p:cNvPr id="4" name="Rectangle 3"/>
+          <p:cNvSpPr/>
+          <p:nvPr/>
+        </p:nvSpPr>
+        <p:spPr>
+          <a:xfrm>
+            <a:off x="838200" y="3099138"/>
+            <a:ext cx="8633012" cy="1477328"/>
+          </a:xfrm>
+          <a:prstGeom prst="rect">
+            <a:avLst/>
+          </a:prstGeom>
+        </p:spPr>
+        <p:txBody>
+          <a:bodyPr wrap="square">
+            <a:spAutoFit/>
+          </a:bodyPr>
+          <a:lstStyle/>
+          <a:p>
+            <a:r>
+              <a:rPr lang="en-US" dirty="0">
+                <a:solidFill>
+                  <a:srgbClr val="000000"/>
+                </a:solidFill>
+                <a:highlight>
+                  <a:srgbClr val="FFFFFF"/>
+                </a:highlight>
+                <a:latin typeface="Cascadia Mono" panose="020B0609020000020004" pitchFamily="49" charset="0"/>
+              </a:rPr>
+              <a:t> </a:t>
+            </a:r>
+            <a:r>
+              <a:rPr lang="en-US" dirty="0">
+                <a:solidFill>
+                  <a:srgbClr val="0000FF"/>
+                </a:solidFill>
+                <a:highlight>
+                  <a:srgbClr val="FFFFFF"/>
+                </a:highlight>
+                <a:latin typeface="Cascadia Mono" panose="020B0609020000020004" pitchFamily="49" charset="0"/>
+              </a:rPr>
+              <a:t>&lt;</a:t>
+            </a:r>
+            <a:r>
+              <a:rPr lang="en-US" b="1" dirty="0">
+                <a:solidFill>
+                  <a:srgbClr val="800080"/>
+                </a:solidFill>
+                <a:highlight>
+                  <a:srgbClr val="FFFFFF"/>
+                </a:highlight>
+                <a:latin typeface="Cascadia Mono" panose="020B0609020000020004" pitchFamily="49" charset="0"/>
+              </a:rPr>
+              <a:t>input</a:t>
+            </a:r>
+            <a:r>
+              <a:rPr lang="en-US" dirty="0">
+                <a:solidFill>
+                  <a:srgbClr val="000000"/>
+                </a:solidFill>
+                <a:highlight>
+                  <a:srgbClr val="FFFFFF"/>
+                </a:highlight>
+                <a:latin typeface="Cascadia Mono" panose="020B0609020000020004" pitchFamily="49" charset="0"/>
+              </a:rPr>
+              <a:t> </a:t>
+            </a:r>
+            <a:r>
+              <a:rPr lang="en-US" b="1" dirty="0">
+                <a:solidFill>
+                  <a:srgbClr val="800080"/>
+                </a:solidFill>
+                <a:highlight>
+                  <a:srgbClr val="FFFFFF"/>
+                </a:highlight>
+                <a:latin typeface="Cascadia Mono" panose="020B0609020000020004" pitchFamily="49" charset="0"/>
+              </a:rPr>
+              <a:t>type</a:t>
+            </a:r>
+            <a:r>
+              <a:rPr lang="en-US" dirty="0">
+                <a:solidFill>
+                  <a:srgbClr val="0000FF"/>
+                </a:solidFill>
+                <a:highlight>
+                  <a:srgbClr val="FFFFFF"/>
+                </a:highlight>
+                <a:latin typeface="Cascadia Mono" panose="020B0609020000020004" pitchFamily="49" charset="0"/>
+              </a:rPr>
+              <a:t>="radio"</a:t>
+            </a:r>
+            <a:r>
+              <a:rPr lang="en-US" dirty="0">
+                <a:solidFill>
+                  <a:srgbClr val="000000"/>
+                </a:solidFill>
+                <a:highlight>
+                  <a:srgbClr val="FFFFFF"/>
+                </a:highlight>
+                <a:latin typeface="Cascadia Mono" panose="020B0609020000020004" pitchFamily="49" charset="0"/>
+              </a:rPr>
+              <a:t> </a:t>
+            </a:r>
+            <a:r>
+              <a:rPr lang="en-US" b="1" dirty="0">
+                <a:solidFill>
+                  <a:srgbClr val="800080"/>
+                </a:solidFill>
+                <a:highlight>
+                  <a:srgbClr val="FFFFFF"/>
+                </a:highlight>
+                <a:latin typeface="Cascadia Mono" panose="020B0609020000020004" pitchFamily="49" charset="0"/>
+              </a:rPr>
+              <a:t>asp-for</a:t>
+            </a:r>
+            <a:r>
+              <a:rPr lang="en-US" dirty="0">
+                <a:solidFill>
+                  <a:srgbClr val="0000FF"/>
+                </a:solidFill>
+                <a:highlight>
+                  <a:srgbClr val="FFFFFF"/>
+                </a:highlight>
+                <a:latin typeface="Cascadia Mono" panose="020B0609020000020004" pitchFamily="49" charset="0"/>
+              </a:rPr>
+              <a:t>="</a:t>
+            </a:r>
+            <a:r>
+              <a:rPr lang="en-US" dirty="0">
+                <a:solidFill>
+                  <a:srgbClr val="000000"/>
+                </a:solidFill>
+                <a:highlight>
+                  <a:srgbClr val="FFFFFF"/>
+                </a:highlight>
+                <a:latin typeface="Cascadia Mono" panose="020B0609020000020004" pitchFamily="49" charset="0"/>
+              </a:rPr>
+              <a:t>Married</a:t>
+            </a:r>
+            <a:r>
+              <a:rPr lang="en-US" dirty="0">
+                <a:solidFill>
+                  <a:srgbClr val="0000FF"/>
+                </a:solidFill>
+                <a:highlight>
+                  <a:srgbClr val="FFFFFF"/>
+                </a:highlight>
+                <a:latin typeface="Cascadia Mono" panose="020B0609020000020004" pitchFamily="49" charset="0"/>
+              </a:rPr>
+              <a:t>"</a:t>
+            </a:r>
+            <a:r>
+              <a:rPr lang="en-US" dirty="0">
+                <a:solidFill>
+                  <a:srgbClr val="000000"/>
+                </a:solidFill>
+                <a:highlight>
+                  <a:srgbClr val="FFFFFF"/>
+                </a:highlight>
+                <a:latin typeface="Cascadia Mono" panose="020B0609020000020004" pitchFamily="49" charset="0"/>
+              </a:rPr>
+              <a:t> </a:t>
+            </a:r>
+            <a:r>
+              <a:rPr lang="en-US" b="1" dirty="0">
+                <a:solidFill>
+                  <a:srgbClr val="800080"/>
+                </a:solidFill>
+                <a:highlight>
+                  <a:srgbClr val="FFFFFF"/>
+                </a:highlight>
+                <a:latin typeface="Cascadia Mono" panose="020B0609020000020004" pitchFamily="49" charset="0"/>
+              </a:rPr>
+              <a:t>value</a:t>
+            </a:r>
+            <a:r>
+              <a:rPr lang="en-US" dirty="0">
+                <a:solidFill>
+                  <a:srgbClr val="0000FF"/>
+                </a:solidFill>
+                <a:highlight>
+                  <a:srgbClr val="FFFFFF"/>
+                </a:highlight>
+                <a:latin typeface="Cascadia Mono" panose="020B0609020000020004" pitchFamily="49" charset="0"/>
+              </a:rPr>
+              <a:t>="Yes"/&gt;</a:t>
+            </a:r>
+          </a:p>
+          <a:p>
+            <a:r>
+              <a:rPr lang="en-US" dirty="0">
+                <a:solidFill>
+                  <a:srgbClr val="000000"/>
+                </a:solidFill>
+                <a:highlight>
+                  <a:srgbClr val="FFFFFF"/>
+                </a:highlight>
+                <a:latin typeface="Cascadia Mono" panose="020B0609020000020004" pitchFamily="49" charset="0"/>
+              </a:rPr>
+              <a:t> Yes</a:t>
+            </a:r>
+          </a:p>
+          <a:p>
+            <a:r>
+              <a:rPr lang="en-US" dirty="0">
+                <a:solidFill>
+                  <a:srgbClr val="000000"/>
+                </a:solidFill>
+                <a:highlight>
+                  <a:srgbClr val="FFFFFF"/>
+                </a:highlight>
+                <a:latin typeface="Cascadia Mono" panose="020B0609020000020004" pitchFamily="49" charset="0"/>
+              </a:rPr>
+              <a:t> </a:t>
+            </a:r>
+            <a:r>
+              <a:rPr lang="en-US" dirty="0">
+                <a:solidFill>
+                  <a:srgbClr val="0000FF"/>
+                </a:solidFill>
+                <a:highlight>
+                  <a:srgbClr val="FFFFFF"/>
+                </a:highlight>
+                <a:latin typeface="Cascadia Mono" panose="020B0609020000020004" pitchFamily="49" charset="0"/>
+              </a:rPr>
+              <a:t>&lt;</a:t>
+            </a:r>
+            <a:r>
+              <a:rPr lang="en-US" dirty="0" err="1">
+                <a:solidFill>
+                  <a:srgbClr val="800000"/>
+                </a:solidFill>
+                <a:highlight>
+                  <a:srgbClr val="FFFFFF"/>
+                </a:highlight>
+                <a:latin typeface="Cascadia Mono" panose="020B0609020000020004" pitchFamily="49" charset="0"/>
+              </a:rPr>
+              <a:t>br</a:t>
+            </a:r>
+            <a:r>
+              <a:rPr lang="en-US" dirty="0">
+                <a:solidFill>
+                  <a:srgbClr val="000000"/>
+                </a:solidFill>
+                <a:highlight>
+                  <a:srgbClr val="FFFFFF"/>
+                </a:highlight>
+                <a:latin typeface="Cascadia Mono" panose="020B0609020000020004" pitchFamily="49" charset="0"/>
+              </a:rPr>
+              <a:t> </a:t>
+            </a:r>
+            <a:r>
+              <a:rPr lang="en-US" dirty="0">
+                <a:solidFill>
+                  <a:srgbClr val="0000FF"/>
+                </a:solidFill>
+                <a:highlight>
+                  <a:srgbClr val="FFFFFF"/>
+                </a:highlight>
+                <a:latin typeface="Cascadia Mono" panose="020B0609020000020004" pitchFamily="49" charset="0"/>
+              </a:rPr>
+              <a:t>/&gt;</a:t>
+            </a:r>
+          </a:p>
+          <a:p>
+            <a:r>
+              <a:rPr lang="en-US" dirty="0">
+                <a:solidFill>
+                  <a:srgbClr val="000000"/>
+                </a:solidFill>
+                <a:highlight>
+                  <a:srgbClr val="FFFFFF"/>
+                </a:highlight>
+                <a:latin typeface="Cascadia Mono" panose="020B0609020000020004" pitchFamily="49" charset="0"/>
+              </a:rPr>
+              <a:t> </a:t>
+            </a:r>
+            <a:r>
+              <a:rPr lang="en-US" dirty="0">
+                <a:solidFill>
+                  <a:srgbClr val="0000FF"/>
+                </a:solidFill>
+                <a:highlight>
+                  <a:srgbClr val="FFFFFF"/>
+                </a:highlight>
+                <a:latin typeface="Cascadia Mono" panose="020B0609020000020004" pitchFamily="49" charset="0"/>
+              </a:rPr>
+              <a:t>&lt;</a:t>
+            </a:r>
+            <a:r>
+              <a:rPr lang="en-US" b="1" dirty="0">
+                <a:solidFill>
+                  <a:srgbClr val="800080"/>
+                </a:solidFill>
+                <a:highlight>
+                  <a:srgbClr val="FFFFFF"/>
+                </a:highlight>
+                <a:latin typeface="Cascadia Mono" panose="020B0609020000020004" pitchFamily="49" charset="0"/>
+              </a:rPr>
+              <a:t>input</a:t>
+            </a:r>
+            <a:r>
+              <a:rPr lang="en-US" dirty="0">
+                <a:solidFill>
+                  <a:srgbClr val="000000"/>
+                </a:solidFill>
+                <a:highlight>
+                  <a:srgbClr val="FFFFFF"/>
+                </a:highlight>
+                <a:latin typeface="Cascadia Mono" panose="020B0609020000020004" pitchFamily="49" charset="0"/>
+              </a:rPr>
+              <a:t> </a:t>
+            </a:r>
+            <a:r>
+              <a:rPr lang="en-US" b="1" dirty="0">
+                <a:solidFill>
+                  <a:srgbClr val="800080"/>
+                </a:solidFill>
+                <a:highlight>
+                  <a:srgbClr val="FFFFFF"/>
+                </a:highlight>
+                <a:latin typeface="Cascadia Mono" panose="020B0609020000020004" pitchFamily="49" charset="0"/>
+              </a:rPr>
+              <a:t>type</a:t>
+            </a:r>
+            <a:r>
+              <a:rPr lang="en-US" dirty="0">
+                <a:solidFill>
+                  <a:srgbClr val="0000FF"/>
+                </a:solidFill>
+                <a:highlight>
+                  <a:srgbClr val="FFFFFF"/>
+                </a:highlight>
+                <a:latin typeface="Cascadia Mono" panose="020B0609020000020004" pitchFamily="49" charset="0"/>
+              </a:rPr>
+              <a:t>="radio"</a:t>
+            </a:r>
+            <a:r>
+              <a:rPr lang="en-US" dirty="0">
+                <a:solidFill>
+                  <a:srgbClr val="000000"/>
+                </a:solidFill>
+                <a:highlight>
+                  <a:srgbClr val="FFFFFF"/>
+                </a:highlight>
+                <a:latin typeface="Cascadia Mono" panose="020B0609020000020004" pitchFamily="49" charset="0"/>
+              </a:rPr>
+              <a:t> </a:t>
+            </a:r>
+            <a:r>
+              <a:rPr lang="en-US" b="1" dirty="0">
+                <a:solidFill>
+                  <a:srgbClr val="800080"/>
+                </a:solidFill>
+                <a:highlight>
+                  <a:srgbClr val="FFFFFF"/>
+                </a:highlight>
+                <a:latin typeface="Cascadia Mono" panose="020B0609020000020004" pitchFamily="49" charset="0"/>
+              </a:rPr>
+              <a:t>asp-for</a:t>
+            </a:r>
+            <a:r>
+              <a:rPr lang="en-US" dirty="0">
+                <a:solidFill>
+                  <a:srgbClr val="0000FF"/>
+                </a:solidFill>
+                <a:highlight>
+                  <a:srgbClr val="FFFFFF"/>
+                </a:highlight>
+                <a:latin typeface="Cascadia Mono" panose="020B0609020000020004" pitchFamily="49" charset="0"/>
+              </a:rPr>
+              <a:t>="</a:t>
+            </a:r>
+            <a:r>
+              <a:rPr lang="en-US" dirty="0">
+                <a:solidFill>
+                  <a:srgbClr val="000000"/>
+                </a:solidFill>
+                <a:highlight>
+                  <a:srgbClr val="FFFFFF"/>
+                </a:highlight>
+                <a:latin typeface="Cascadia Mono" panose="020B0609020000020004" pitchFamily="49" charset="0"/>
+              </a:rPr>
+              <a:t>Married</a:t>
+            </a:r>
+            <a:r>
+              <a:rPr lang="en-US" dirty="0">
+                <a:solidFill>
+                  <a:srgbClr val="0000FF"/>
+                </a:solidFill>
+                <a:highlight>
+                  <a:srgbClr val="FFFFFF"/>
+                </a:highlight>
+                <a:latin typeface="Cascadia Mono" panose="020B0609020000020004" pitchFamily="49" charset="0"/>
+              </a:rPr>
+              <a:t>"</a:t>
+            </a:r>
+            <a:r>
+              <a:rPr lang="en-US" dirty="0">
+                <a:solidFill>
+                  <a:srgbClr val="000000"/>
+                </a:solidFill>
+                <a:highlight>
+                  <a:srgbClr val="FFFFFF"/>
+                </a:highlight>
+                <a:latin typeface="Cascadia Mono" panose="020B0609020000020004" pitchFamily="49" charset="0"/>
+              </a:rPr>
+              <a:t> </a:t>
+            </a:r>
+            <a:r>
+              <a:rPr lang="en-US" b="1" dirty="0">
+                <a:solidFill>
+                  <a:srgbClr val="800080"/>
+                </a:solidFill>
+                <a:highlight>
+                  <a:srgbClr val="FFFFFF"/>
+                </a:highlight>
+                <a:latin typeface="Cascadia Mono" panose="020B0609020000020004" pitchFamily="49" charset="0"/>
+              </a:rPr>
+              <a:t>value</a:t>
+            </a:r>
+            <a:r>
+              <a:rPr lang="en-US" dirty="0">
+                <a:solidFill>
+                  <a:srgbClr val="0000FF"/>
+                </a:solidFill>
+                <a:highlight>
+                  <a:srgbClr val="FFFFFF"/>
+                </a:highlight>
+                <a:latin typeface="Cascadia Mono" panose="020B0609020000020004" pitchFamily="49" charset="0"/>
+              </a:rPr>
+              <a:t>="No"/&gt;</a:t>
+            </a:r>
+            <a:r>
+              <a:rPr lang="en-US" dirty="0">
+                <a:solidFill>
+                  <a:srgbClr val="000000"/>
+                </a:solidFill>
+                <a:highlight>
+                  <a:srgbClr val="FFFFFF"/>
+                </a:highlight>
+                <a:latin typeface="Cascadia Mono" panose="020B0609020000020004" pitchFamily="49" charset="0"/>
+              </a:rPr>
+              <a:t>No</a:t>
+            </a:r>
+          </a:p>
+          <a:p>
+            <a:r>
+              <a:rPr lang="en-US" dirty="0">
+                <a:solidFill>
+                  <a:srgbClr val="000000"/>
+                </a:solidFill>
+                <a:highlight>
+                  <a:srgbClr val="FFFFFF"/>
+                </a:highlight>
+                <a:latin typeface="Cascadia Mono" panose="020B0609020000020004" pitchFamily="49" charset="0"/>
+              </a:rPr>
+              <a:t> </a:t>
+            </a:r>
+            <a:endParaRPr lang="en-US" dirty="0"/>
+          </a:p>
+        </p:txBody>
+      </p:sp>
+    </p:spTree>
+    <p:extLst>
+      <p:ext uri="{BB962C8B-B14F-4D97-AF65-F5344CB8AC3E}">
+        <p14:creationId xmlns:p14="http://schemas.microsoft.com/office/powerpoint/2010/main" val="1454481790"/>
+      </p:ext>
+    </p:extLst>
+  </p:cSld>
+  <p:clrMapOvr>
+    <a:masterClrMapping/>
+  </p:clrMapOvr>
+</p:sld>
+</file>
+
 <file path=ppt/slides/slide2.xml><?xml version="1.0" encoding="utf-8"?>
 <p:sld xmlns:a="http://schemas.openxmlformats.org/drawingml/2006/main" xmlns:r="http://schemas.openxmlformats.org/officeDocument/2006/relationships" xmlns:p="http://schemas.openxmlformats.org/presentationml/2006/main">
   <p:cSld>
@@ -4347,7 +4919,6 @@
               <a:rPr lang="en-US" dirty="0" smtClean="0"/>
               <a:t>asp-action</a:t>
             </a:r>
-            <a:endParaRPr lang="en-US" dirty="0" smtClean="0"/>
           </a:p>
         </p:txBody>
       </p:sp>
@@ -6127,7 +6698,15 @@
           <a:bodyPr/>
           <a:lstStyle/>
           <a:p>
-            <a:endParaRPr lang="en-US"/>
+            <a:r>
+              <a:rPr lang="en-US" dirty="0" err="1"/>
+              <a:t>TextBox</a:t>
+            </a:r>
+            <a:r>
+              <a:rPr lang="en-US" dirty="0"/>
+              <a:t> Tag Helper</a:t>
+            </a:r>
+            <a:endParaRPr lang="en-US" dirty="0"/>
           </a:p>
         </p:txBody>
       </p:sp>
@@ -6146,7 +6725,685 @@
           <a:bodyPr/>
           <a:lstStyle/>
           <a:p>
-            <a:endParaRPr lang="en-US"/>
+            <a:pPr lvl="0" eaLnBrk="0" fontAlgn="base" hangingPunct="0">
+              <a:spcBef>
+                <a:spcPct val="0"/>
+              </a:spcBef>
+              <a:spcAft>
+                <a:spcPct val="0"/>
+              </a:spcAft>
+            </a:pPr>
+            <a:r>
+              <a:rPr lang="en-US" altLang="en-US" dirty="0">
+                <a:solidFill>
+                  <a:srgbClr val="1D1F25"/>
+                </a:solidFill>
+                <a:latin typeface="Arial Unicode MS"/>
+              </a:rPr>
+              <a:t>property </a:t>
+            </a:r>
+            <a:r>
+              <a:rPr lang="en-US" altLang="en-US" dirty="0" smtClean="0">
+                <a:solidFill>
+                  <a:srgbClr val="FF0000"/>
+                </a:solidFill>
+                <a:latin typeface="Arial Unicode MS"/>
+              </a:rPr>
+              <a:t>asp-for</a:t>
+            </a:r>
+          </a:p>
+          <a:p>
+            <a:pPr marL="0" lvl="0" indent="0" eaLnBrk="0" fontAlgn="base" hangingPunct="0">
+              <a:spcBef>
+                <a:spcPct val="0"/>
+              </a:spcBef>
+              <a:spcAft>
+                <a:spcPct val="0"/>
+              </a:spcAft>
+              <a:buNone/>
+            </a:pPr>
+            <a:endParaRPr lang="en-US" altLang="en-US" dirty="0">
+              <a:solidFill>
+                <a:srgbClr val="FF0000"/>
+              </a:solidFill>
+              <a:latin typeface="Arial Unicode MS"/>
+            </a:endParaRPr>
+          </a:p>
+          <a:p>
+            <a:pPr marL="0" lvl="0" indent="0" eaLnBrk="0" fontAlgn="base" hangingPunct="0">
+              <a:spcBef>
+                <a:spcPct val="0"/>
+              </a:spcBef>
+              <a:spcAft>
+                <a:spcPct val="0"/>
+              </a:spcAft>
+              <a:buNone/>
+            </a:pPr>
+            <a:endParaRPr lang="en-US" altLang="en-US" dirty="0" smtClean="0">
+              <a:solidFill>
+                <a:srgbClr val="FF0000"/>
+              </a:solidFill>
+              <a:latin typeface="Arial Unicode MS"/>
+            </a:endParaRPr>
+          </a:p>
+          <a:p>
+            <a:pPr marL="0" lvl="0" indent="0" eaLnBrk="0" fontAlgn="base" hangingPunct="0">
+              <a:spcBef>
+                <a:spcPct val="0"/>
+              </a:spcBef>
+              <a:spcAft>
+                <a:spcPct val="0"/>
+              </a:spcAft>
+              <a:buNone/>
+            </a:pPr>
+            <a:endParaRPr lang="en-US" altLang="en-US" dirty="0">
+              <a:solidFill>
+                <a:srgbClr val="FF0000"/>
+              </a:solidFill>
+              <a:latin typeface="Arial Unicode MS"/>
+            </a:endParaRPr>
+          </a:p>
+          <a:p>
+            <a:pPr marL="0" lvl="0" indent="0" eaLnBrk="0" fontAlgn="base" hangingPunct="0">
+              <a:spcBef>
+                <a:spcPct val="0"/>
+              </a:spcBef>
+              <a:spcAft>
+                <a:spcPct val="0"/>
+              </a:spcAft>
+              <a:buNone/>
+            </a:pPr>
+            <a:endParaRPr lang="en-US" altLang="en-US" dirty="0" smtClean="0">
+              <a:solidFill>
+                <a:srgbClr val="FF0000"/>
+              </a:solidFill>
+              <a:latin typeface="Arial Unicode MS"/>
+            </a:endParaRPr>
+          </a:p>
+          <a:p>
+            <a:pPr marL="0" lvl="0" indent="0" eaLnBrk="0" fontAlgn="base" hangingPunct="0">
+              <a:spcBef>
+                <a:spcPct val="0"/>
+              </a:spcBef>
+              <a:spcAft>
+                <a:spcPct val="0"/>
+              </a:spcAft>
+              <a:buNone/>
+            </a:pPr>
+            <a:endParaRPr lang="en-US" altLang="en-US" dirty="0">
+              <a:solidFill>
+                <a:srgbClr val="FF0000"/>
+              </a:solidFill>
+              <a:latin typeface="Arial Unicode MS"/>
+            </a:endParaRPr>
+          </a:p>
+          <a:p>
+            <a:pPr marL="0" lvl="0" indent="0" eaLnBrk="0" fontAlgn="base" hangingPunct="0">
+              <a:spcBef>
+                <a:spcPct val="0"/>
+              </a:spcBef>
+              <a:spcAft>
+                <a:spcPct val="0"/>
+              </a:spcAft>
+              <a:buNone/>
+            </a:pPr>
+            <a:r>
+              <a:rPr lang="en-US" altLang="en-US" dirty="0" smtClean="0">
+                <a:latin typeface="Arial Unicode MS"/>
+              </a:rPr>
+              <a:t>Property</a:t>
+            </a:r>
+            <a:r>
+              <a:rPr lang="en-US" altLang="en-US" dirty="0" smtClean="0">
+                <a:solidFill>
+                  <a:srgbClr val="FF0000"/>
+                </a:solidFill>
+                <a:latin typeface="Arial Unicode MS"/>
+              </a:rPr>
+              <a:t> asp-for</a:t>
+            </a:r>
+            <a:endParaRPr lang="en-US" altLang="en-US" dirty="0">
+              <a:solidFill>
+                <a:srgbClr val="FF0000"/>
+              </a:solidFill>
+              <a:latin typeface="Arial Unicode MS"/>
+            </a:endParaRPr>
+          </a:p>
+        </p:txBody>
+      </p:sp>
+      <p:sp>
+        <p:nvSpPr>
+          <p:cNvPr id="4" name="Rectangle 3"/>
+          <p:cNvSpPr/>
+          <p:nvPr/>
+        </p:nvSpPr>
+        <p:spPr>
+          <a:xfrm>
+            <a:off x="972670" y="2352799"/>
+            <a:ext cx="10515600" cy="369332"/>
+          </a:xfrm>
+          <a:prstGeom prst="rect">
+            <a:avLst/>
+          </a:prstGeom>
+        </p:spPr>
+        <p:txBody>
+          <a:bodyPr wrap="square">
+            <a:spAutoFit/>
+          </a:bodyPr>
+          <a:lstStyle/>
+          <a:p>
+            <a:r>
+              <a:rPr lang="en-US" dirty="0">
+                <a:solidFill>
+                  <a:srgbClr val="0000FF"/>
+                </a:solidFill>
+                <a:highlight>
+                  <a:srgbClr val="FFFFFF"/>
+                </a:highlight>
+                <a:latin typeface="Cascadia Mono" panose="020B0609020000020004" pitchFamily="49" charset="0"/>
+              </a:rPr>
+              <a:t>&lt;</a:t>
+            </a:r>
+            <a:r>
+              <a:rPr lang="en-US" b="1" dirty="0">
+                <a:solidFill>
+                  <a:srgbClr val="800080"/>
+                </a:solidFill>
+                <a:highlight>
+                  <a:srgbClr val="FFFFFF"/>
+                </a:highlight>
+                <a:latin typeface="Cascadia Mono" panose="020B0609020000020004" pitchFamily="49" charset="0"/>
+              </a:rPr>
+              <a:t>input</a:t>
+            </a:r>
+            <a:r>
+              <a:rPr lang="en-US" dirty="0">
+                <a:solidFill>
+                  <a:srgbClr val="000000"/>
+                </a:solidFill>
+                <a:highlight>
+                  <a:srgbClr val="FFFFFF"/>
+                </a:highlight>
+                <a:latin typeface="Cascadia Mono" panose="020B0609020000020004" pitchFamily="49" charset="0"/>
+              </a:rPr>
+              <a:t> </a:t>
+            </a:r>
+            <a:r>
+              <a:rPr lang="en-US" b="1" dirty="0">
+                <a:solidFill>
+                  <a:srgbClr val="800080"/>
+                </a:solidFill>
+                <a:highlight>
+                  <a:srgbClr val="FFFFFF"/>
+                </a:highlight>
+                <a:latin typeface="Cascadia Mono" panose="020B0609020000020004" pitchFamily="49" charset="0"/>
+              </a:rPr>
+              <a:t>type</a:t>
+            </a:r>
+            <a:r>
+              <a:rPr lang="en-US" dirty="0">
+                <a:solidFill>
+                  <a:srgbClr val="0000FF"/>
+                </a:solidFill>
+                <a:highlight>
+                  <a:srgbClr val="FFFFFF"/>
+                </a:highlight>
+                <a:latin typeface="Cascadia Mono" panose="020B0609020000020004" pitchFamily="49" charset="0"/>
+              </a:rPr>
+              <a:t>="text"</a:t>
+            </a:r>
+            <a:r>
+              <a:rPr lang="en-US" dirty="0">
+                <a:solidFill>
+                  <a:srgbClr val="000000"/>
+                </a:solidFill>
+                <a:highlight>
+                  <a:srgbClr val="FFFFFF"/>
+                </a:highlight>
+                <a:latin typeface="Cascadia Mono" panose="020B0609020000020004" pitchFamily="49" charset="0"/>
+              </a:rPr>
+              <a:t> </a:t>
+            </a:r>
+            <a:r>
+              <a:rPr lang="en-US" b="1" dirty="0">
+                <a:solidFill>
+                  <a:srgbClr val="800080"/>
+                </a:solidFill>
+                <a:highlight>
+                  <a:srgbClr val="FFFFFF"/>
+                </a:highlight>
+                <a:latin typeface="Cascadia Mono" panose="020B0609020000020004" pitchFamily="49" charset="0"/>
+              </a:rPr>
+              <a:t>asp-for</a:t>
+            </a:r>
+            <a:r>
+              <a:rPr lang="en-US" dirty="0">
+                <a:solidFill>
+                  <a:srgbClr val="0000FF"/>
+                </a:solidFill>
+                <a:highlight>
+                  <a:srgbClr val="FFFFFF"/>
+                </a:highlight>
+                <a:latin typeface="Cascadia Mono" panose="020B0609020000020004" pitchFamily="49" charset="0"/>
+              </a:rPr>
+              <a:t>="</a:t>
+            </a:r>
+            <a:r>
+              <a:rPr lang="en-US" dirty="0">
+                <a:solidFill>
+                  <a:srgbClr val="000000"/>
+                </a:solidFill>
+                <a:highlight>
+                  <a:srgbClr val="FFFFFF"/>
+                </a:highlight>
+                <a:latin typeface="Cascadia Mono" panose="020B0609020000020004" pitchFamily="49" charset="0"/>
+              </a:rPr>
+              <a:t>Designation</a:t>
+            </a:r>
+            <a:r>
+              <a:rPr lang="en-US" dirty="0">
+                <a:solidFill>
+                  <a:srgbClr val="0000FF"/>
+                </a:solidFill>
+                <a:highlight>
+                  <a:srgbClr val="FFFFFF"/>
+                </a:highlight>
+                <a:latin typeface="Cascadia Mono" panose="020B0609020000020004" pitchFamily="49" charset="0"/>
+              </a:rPr>
+              <a:t>"</a:t>
+            </a:r>
+            <a:r>
+              <a:rPr lang="en-US" dirty="0">
+                <a:solidFill>
+                  <a:srgbClr val="000000"/>
+                </a:solidFill>
+                <a:highlight>
+                  <a:srgbClr val="FFFFFF"/>
+                </a:highlight>
+                <a:latin typeface="Cascadia Mono" panose="020B0609020000020004" pitchFamily="49" charset="0"/>
+              </a:rPr>
+              <a:t> </a:t>
+            </a:r>
+            <a:r>
+              <a:rPr lang="en-US" dirty="0">
+                <a:solidFill>
+                  <a:srgbClr val="FF0000"/>
+                </a:solidFill>
+                <a:highlight>
+                  <a:srgbClr val="FFFFFF"/>
+                </a:highlight>
+                <a:latin typeface="Cascadia Mono" panose="020B0609020000020004" pitchFamily="49" charset="0"/>
+              </a:rPr>
+              <a:t>asp-</a:t>
+            </a:r>
+            <a:r>
+              <a:rPr lang="en-US" dirty="0">
+                <a:solidFill>
+                  <a:srgbClr val="000000"/>
+                </a:solidFill>
+                <a:highlight>
+                  <a:srgbClr val="FFFFFF"/>
+                </a:highlight>
+                <a:latin typeface="Cascadia Mono" panose="020B0609020000020004" pitchFamily="49" charset="0"/>
+              </a:rPr>
+              <a:t> </a:t>
+            </a:r>
+            <a:r>
+              <a:rPr lang="en-US" dirty="0">
+                <a:solidFill>
+                  <a:srgbClr val="FF0000"/>
+                </a:solidFill>
+                <a:highlight>
+                  <a:srgbClr val="FFFFFF"/>
+                </a:highlight>
+                <a:latin typeface="Cascadia Mono" panose="020B0609020000020004" pitchFamily="49" charset="0"/>
+              </a:rPr>
+              <a:t>placeholder</a:t>
+            </a:r>
+            <a:r>
+              <a:rPr lang="en-US" dirty="0">
+                <a:solidFill>
+                  <a:srgbClr val="0000FF"/>
+                </a:solidFill>
+                <a:highlight>
+                  <a:srgbClr val="FFFFFF"/>
+                </a:highlight>
+                <a:latin typeface="Cascadia Mono" panose="020B0609020000020004" pitchFamily="49" charset="0"/>
+              </a:rPr>
+              <a:t>="Designation"</a:t>
+            </a:r>
+            <a:r>
+              <a:rPr lang="en-US" dirty="0">
+                <a:solidFill>
+                  <a:srgbClr val="000000"/>
+                </a:solidFill>
+                <a:highlight>
+                  <a:srgbClr val="FFFFFF"/>
+                </a:highlight>
+                <a:latin typeface="Cascadia Mono" panose="020B0609020000020004" pitchFamily="49" charset="0"/>
+              </a:rPr>
+              <a:t> </a:t>
+            </a:r>
+            <a:r>
+              <a:rPr lang="en-US" dirty="0">
+                <a:solidFill>
+                  <a:srgbClr val="0000FF"/>
+                </a:solidFill>
+                <a:highlight>
+                  <a:srgbClr val="FFFFFF"/>
+                </a:highlight>
+                <a:latin typeface="Cascadia Mono" panose="020B0609020000020004" pitchFamily="49" charset="0"/>
+              </a:rPr>
+              <a:t>/&gt;</a:t>
+            </a:r>
+            <a:endParaRPr lang="en-US" dirty="0"/>
+          </a:p>
+        </p:txBody>
+      </p:sp>
+      <p:sp>
+        <p:nvSpPr>
+          <p:cNvPr id="5" name="Title 1"/>
+          <p:cNvSpPr txBox="1">
+            <a:spLocks/>
+          </p:cNvSpPr>
+          <p:nvPr/>
+        </p:nvSpPr>
+        <p:spPr>
+          <a:xfrm>
+            <a:off x="829236" y="2924547"/>
+            <a:ext cx="10515600" cy="1325563"/>
+          </a:xfrm>
+          <a:prstGeom prst="rect">
+            <a:avLst/>
+          </a:prstGeom>
+        </p:spPr>
+        <p:txBody>
+          <a:bodyPr vert="horz" lIns="91440" tIns="45720" rIns="91440" bIns="45720" rtlCol="0" anchor="ctr">
+            <a:normAutofit/>
+          </a:bodyPr>
+          <a:lstStyle>
+            <a:lvl1pPr algn="l" defTabSz="914400" rtl="0" eaLnBrk="1" latinLnBrk="0" hangingPunct="1">
+              <a:lnSpc>
+                <a:spcPct val="90000"/>
+              </a:lnSpc>
+              <a:spcBef>
+                <a:spcPct val="0"/>
+              </a:spcBef>
+              <a:buNone/>
+              <a:defRPr sz="4400" kern="1200">
+                <a:solidFill>
+                  <a:schemeClr val="tx1"/>
+                </a:solidFill>
+                <a:latin typeface="+mj-lt"/>
+                <a:ea typeface="+mj-ea"/>
+                <a:cs typeface="+mj-cs"/>
+              </a:defRPr>
+            </a:lvl1pPr>
+          </a:lstStyle>
+          <a:p>
+            <a:r>
+              <a:rPr lang="en-US" dirty="0" err="1" smtClean="0"/>
+              <a:t>TextArea</a:t>
+            </a:r>
+            <a:r>
+              <a:rPr lang="en-US" dirty="0" smtClean="0"/>
+              <a:t> Tag Helper</a:t>
+            </a:r>
+            <a:endParaRPr lang="en-US" dirty="0"/>
+          </a:p>
+        </p:txBody>
+      </p:sp>
+      <p:sp>
+        <p:nvSpPr>
+          <p:cNvPr id="6" name="Rectangle 5"/>
+          <p:cNvSpPr/>
+          <p:nvPr/>
+        </p:nvSpPr>
+        <p:spPr>
+          <a:xfrm>
+            <a:off x="1851212" y="4748867"/>
+            <a:ext cx="9637058" cy="923330"/>
+          </a:xfrm>
+          <a:prstGeom prst="rect">
+            <a:avLst/>
+          </a:prstGeom>
+        </p:spPr>
+        <p:txBody>
+          <a:bodyPr wrap="square">
+            <a:spAutoFit/>
+          </a:bodyPr>
+          <a:lstStyle/>
+          <a:p>
+            <a:r>
+              <a:rPr lang="en-US" dirty="0">
+                <a:solidFill>
+                  <a:srgbClr val="000000"/>
+                </a:solidFill>
+                <a:highlight>
+                  <a:srgbClr val="FFFFFF"/>
+                </a:highlight>
+                <a:latin typeface="Cascadia Mono" panose="020B0609020000020004" pitchFamily="49" charset="0"/>
+              </a:rPr>
+              <a:t> </a:t>
+            </a:r>
+            <a:r>
+              <a:rPr lang="en-US" dirty="0">
+                <a:solidFill>
+                  <a:srgbClr val="0000FF"/>
+                </a:solidFill>
+                <a:highlight>
+                  <a:srgbClr val="FFFFFF"/>
+                </a:highlight>
+                <a:latin typeface="Cascadia Mono" panose="020B0609020000020004" pitchFamily="49" charset="0"/>
+              </a:rPr>
+              <a:t>&lt;</a:t>
+            </a:r>
+            <a:r>
+              <a:rPr lang="en-US" b="1" dirty="0" err="1">
+                <a:solidFill>
+                  <a:srgbClr val="800080"/>
+                </a:solidFill>
+                <a:highlight>
+                  <a:srgbClr val="FFFFFF"/>
+                </a:highlight>
+                <a:latin typeface="Cascadia Mono" panose="020B0609020000020004" pitchFamily="49" charset="0"/>
+              </a:rPr>
+              <a:t>textarea</a:t>
+            </a:r>
+            <a:r>
+              <a:rPr lang="en-US" dirty="0">
+                <a:solidFill>
+                  <a:srgbClr val="000000"/>
+                </a:solidFill>
+                <a:highlight>
+                  <a:srgbClr val="FFFFFF"/>
+                </a:highlight>
+                <a:latin typeface="Cascadia Mono" panose="020B0609020000020004" pitchFamily="49" charset="0"/>
+              </a:rPr>
+              <a:t> </a:t>
+            </a:r>
+            <a:r>
+              <a:rPr lang="en-US" b="1" dirty="0">
+                <a:solidFill>
+                  <a:srgbClr val="800080"/>
+                </a:solidFill>
+                <a:highlight>
+                  <a:srgbClr val="FFFFFF"/>
+                </a:highlight>
+                <a:latin typeface="Cascadia Mono" panose="020B0609020000020004" pitchFamily="49" charset="0"/>
+              </a:rPr>
+              <a:t>asp-for</a:t>
+            </a:r>
+            <a:r>
+              <a:rPr lang="en-US" dirty="0">
+                <a:solidFill>
+                  <a:srgbClr val="0000FF"/>
+                </a:solidFill>
+                <a:highlight>
+                  <a:srgbClr val="FFFFFF"/>
+                </a:highlight>
+                <a:latin typeface="Cascadia Mono" panose="020B0609020000020004" pitchFamily="49" charset="0"/>
+              </a:rPr>
+              <a:t>="</a:t>
+            </a:r>
+            <a:r>
+              <a:rPr lang="en-US" dirty="0">
+                <a:solidFill>
+                  <a:srgbClr val="000000"/>
+                </a:solidFill>
+                <a:highlight>
+                  <a:srgbClr val="FFFFFF"/>
+                </a:highlight>
+                <a:latin typeface="Cascadia Mono" panose="020B0609020000020004" pitchFamily="49" charset="0"/>
+              </a:rPr>
+              <a:t>Description</a:t>
+            </a:r>
+            <a:r>
+              <a:rPr lang="en-US" dirty="0">
+                <a:solidFill>
+                  <a:srgbClr val="0000FF"/>
+                </a:solidFill>
+                <a:highlight>
+                  <a:srgbClr val="FFFFFF"/>
+                </a:highlight>
+                <a:latin typeface="Cascadia Mono" panose="020B0609020000020004" pitchFamily="49" charset="0"/>
+              </a:rPr>
+              <a:t>"</a:t>
+            </a:r>
+            <a:r>
+              <a:rPr lang="en-US" dirty="0">
+                <a:solidFill>
+                  <a:srgbClr val="000000"/>
+                </a:solidFill>
+                <a:highlight>
+                  <a:srgbClr val="FFFFFF"/>
+                </a:highlight>
+                <a:latin typeface="Cascadia Mono" panose="020B0609020000020004" pitchFamily="49" charset="0"/>
+              </a:rPr>
+              <a:t> </a:t>
+            </a:r>
+            <a:r>
+              <a:rPr lang="en-US" dirty="0">
+                <a:solidFill>
+                  <a:srgbClr val="FF0000"/>
+                </a:solidFill>
+                <a:highlight>
+                  <a:srgbClr val="FFFFFF"/>
+                </a:highlight>
+                <a:latin typeface="Cascadia Mono" panose="020B0609020000020004" pitchFamily="49" charset="0"/>
+              </a:rPr>
+              <a:t>placeholder</a:t>
+            </a:r>
+            <a:r>
+              <a:rPr lang="en-US" dirty="0">
+                <a:solidFill>
+                  <a:srgbClr val="0000FF"/>
+                </a:solidFill>
+                <a:highlight>
+                  <a:srgbClr val="FFFFFF"/>
+                </a:highlight>
+                <a:latin typeface="Cascadia Mono" panose="020B0609020000020004" pitchFamily="49" charset="0"/>
+              </a:rPr>
+              <a:t>="Description"</a:t>
+            </a:r>
+            <a:r>
+              <a:rPr lang="en-US" dirty="0">
+                <a:solidFill>
+                  <a:srgbClr val="000000"/>
+                </a:solidFill>
+                <a:highlight>
+                  <a:srgbClr val="FFFFFF"/>
+                </a:highlight>
+                <a:latin typeface="Cascadia Mono" panose="020B0609020000020004" pitchFamily="49" charset="0"/>
+              </a:rPr>
+              <a:t> </a:t>
+            </a:r>
+            <a:r>
+              <a:rPr lang="en-US" dirty="0">
+                <a:solidFill>
+                  <a:srgbClr val="FF0000"/>
+                </a:solidFill>
+                <a:highlight>
+                  <a:srgbClr val="FFFFFF"/>
+                </a:highlight>
+                <a:latin typeface="Cascadia Mono" panose="020B0609020000020004" pitchFamily="49" charset="0"/>
+              </a:rPr>
+              <a:t>rows</a:t>
+            </a:r>
+            <a:r>
+              <a:rPr lang="en-US" dirty="0">
+                <a:solidFill>
+                  <a:srgbClr val="0000FF"/>
+                </a:solidFill>
+                <a:highlight>
+                  <a:srgbClr val="FFFFFF"/>
+                </a:highlight>
+                <a:latin typeface="Cascadia Mono" panose="020B0609020000020004" pitchFamily="49" charset="0"/>
+              </a:rPr>
+              <a:t>="5"&gt;</a:t>
+            </a:r>
+          </a:p>
+          <a:p>
+            <a:endParaRPr lang="en-US" dirty="0">
+              <a:solidFill>
+                <a:srgbClr val="0000FF"/>
+              </a:solidFill>
+              <a:highlight>
+                <a:srgbClr val="FFFFFF"/>
+              </a:highlight>
+              <a:latin typeface="Cascadia Mono" panose="020B0609020000020004" pitchFamily="49" charset="0"/>
+            </a:endParaRPr>
+          </a:p>
+          <a:p>
+            <a:r>
+              <a:rPr lang="en-US" dirty="0">
+                <a:solidFill>
+                  <a:srgbClr val="000000"/>
+                </a:solidFill>
+                <a:highlight>
+                  <a:srgbClr val="FFFFFF"/>
+                </a:highlight>
+                <a:latin typeface="Cascadia Mono" panose="020B0609020000020004" pitchFamily="49" charset="0"/>
+              </a:rPr>
+              <a:t> </a:t>
+            </a:r>
+            <a:r>
+              <a:rPr lang="en-US" dirty="0">
+                <a:solidFill>
+                  <a:srgbClr val="0000FF"/>
+                </a:solidFill>
+                <a:highlight>
+                  <a:srgbClr val="FFFFFF"/>
+                </a:highlight>
+                <a:latin typeface="Cascadia Mono" panose="020B0609020000020004" pitchFamily="49" charset="0"/>
+              </a:rPr>
+              <a:t>&lt;/</a:t>
+            </a:r>
+            <a:r>
+              <a:rPr lang="en-US" b="1" dirty="0" err="1">
+                <a:solidFill>
+                  <a:srgbClr val="800080"/>
+                </a:solidFill>
+                <a:highlight>
+                  <a:srgbClr val="FFFFFF"/>
+                </a:highlight>
+                <a:latin typeface="Cascadia Mono" panose="020B0609020000020004" pitchFamily="49" charset="0"/>
+              </a:rPr>
+              <a:t>textarea</a:t>
+            </a:r>
+            <a:r>
+              <a:rPr lang="en-US" dirty="0">
+                <a:solidFill>
+                  <a:srgbClr val="0000FF"/>
+                </a:solidFill>
+                <a:highlight>
+                  <a:srgbClr val="FFFFFF"/>
+                </a:highlight>
+                <a:latin typeface="Cascadia Mono" panose="020B0609020000020004" pitchFamily="49" charset="0"/>
+              </a:rPr>
+              <a:t>&gt;</a:t>
+            </a:r>
+            <a:endParaRPr lang="en-US" dirty="0"/>
           </a:p>
         </p:txBody>
       </p:sp>

</xml_diff>